<commit_message>
Korrektur der Korrektur der Korrektur
</commit_message>
<xml_diff>
--- a/2021-11-09/js-4.1.pptx
+++ b/2021-11-09/js-4.1.pptx
@@ -12917,7 +12917,7 @@
         <p:spPr bwMode="auto">
           <a:xfrm>
             <a:off x="2945137" y="2367171"/>
-            <a:ext cx="5876930" cy="2123658"/>
+            <a:ext cx="6046848" cy="2123658"/>
           </a:xfrm>
           <a:prstGeom prst="rect">
             <a:avLst/>
@@ -13460,46 +13460,7 @@
                 <a:effectLst/>
                 <a:latin typeface="Consolas" panose="020B0609020204030204" pitchFamily="49" charset="0"/>
               </a:rPr>
-              <a:t>"p"</a:t>
-            </a:r>
-            <a:r>
-              <a:rPr kumimoji="0" lang="de-DE" altLang="de-DE" sz="1200" b="0" i="0" u="none" strike="noStrike" cap="none" normalizeH="0" baseline="0" dirty="0">
-                <a:ln>
-                  <a:noFill/>
-                </a:ln>
-                <a:solidFill>
-                  <a:srgbClr val="A9B7C6"/>
-                </a:solidFill>
-                <a:effectLst/>
-                <a:latin typeface="Consolas" panose="020B0609020204030204" pitchFamily="49" charset="0"/>
-              </a:rPr>
-              <a:t>)[</a:t>
-            </a:r>
-            <a:r>
-              <a:rPr kumimoji="0" lang="de-DE" altLang="de-DE" sz="1200" b="0" i="0" u="none" strike="noStrike" cap="none" normalizeH="0" baseline="0" dirty="0">
-                <a:ln>
-                  <a:noFill/>
-                </a:ln>
-                <a:solidFill>
-                  <a:srgbClr val="6897BB"/>
-                </a:solidFill>
-                <a:effectLst/>
-                <a:latin typeface="Consolas" panose="020B0609020204030204" pitchFamily="49" charset="0"/>
-              </a:rPr>
-              <a:t>2</a:t>
-            </a:r>
-            <a:r>
-              <a:rPr kumimoji="0" lang="de-DE" altLang="de-DE" sz="1200" b="0" i="0" u="none" strike="noStrike" cap="none" normalizeH="0" baseline="0" dirty="0">
-                <a:ln>
-                  <a:noFill/>
-                </a:ln>
-                <a:solidFill>
-                  <a:srgbClr val="A9B7C6"/>
-                </a:solidFill>
-                <a:effectLst/>
-                <a:latin typeface="Consolas" panose="020B0609020204030204" pitchFamily="49" charset="0"/>
-              </a:rPr>
-              <a:t>].</a:t>
+              <a:t>"</a:t>
             </a:r>
             <a:r>
               <a:rPr kumimoji="0" lang="de-DE" altLang="de-DE" sz="1200" b="0" i="0" u="none" strike="noStrike" cap="none" normalizeH="0" baseline="0" dirty="0" err="1">
@@ -13507,6 +13468,45 @@
                   <a:noFill/>
                 </a:ln>
                 <a:solidFill>
+                  <a:srgbClr val="6A8759"/>
+                </a:solidFill>
+                <a:effectLst/>
+                <a:latin typeface="Consolas" panose="020B0609020204030204" pitchFamily="49" charset="0"/>
+              </a:rPr>
+              <a:t>p:eq</a:t>
+            </a:r>
+            <a:r>
+              <a:rPr kumimoji="0" lang="de-DE" altLang="de-DE" sz="1200" b="0" i="0" u="none" strike="noStrike" cap="none" normalizeH="0" baseline="0" dirty="0">
+                <a:ln>
+                  <a:noFill/>
+                </a:ln>
+                <a:solidFill>
+                  <a:srgbClr val="6A8759"/>
+                </a:solidFill>
+                <a:effectLst/>
+                <a:latin typeface="Consolas" panose="020B0609020204030204" pitchFamily="49" charset="0"/>
+              </a:rPr>
+              <a:t>(2)"</a:t>
+            </a:r>
+            <a:r>
+              <a:rPr kumimoji="0" lang="de-DE" altLang="de-DE" sz="1200" b="0" i="0" u="none" strike="noStrike" cap="none" normalizeH="0" baseline="0" dirty="0">
+                <a:ln>
+                  <a:noFill/>
+                </a:ln>
+                <a:solidFill>
+                  <a:srgbClr val="A9B7C6"/>
+                </a:solidFill>
+                <a:effectLst/>
+                <a:latin typeface="Consolas" panose="020B0609020204030204" pitchFamily="49" charset="0"/>
+              </a:rPr>
+              <a:t>).</a:t>
+            </a:r>
+            <a:r>
+              <a:rPr kumimoji="0" lang="de-DE" altLang="de-DE" sz="1200" b="0" i="0" u="none" strike="noStrike" cap="none" normalizeH="0" baseline="0" dirty="0" err="1">
+                <a:ln>
+                  <a:noFill/>
+                </a:ln>
+                <a:solidFill>
                   <a:srgbClr val="9876AA"/>
                 </a:solidFill>
                 <a:effectLst/>
@@ -13538,32 +13538,19 @@
                 <a:effectLst/>
                 <a:latin typeface="Consolas" panose="020B0609020204030204" pitchFamily="49" charset="0"/>
               </a:rPr>
-              <a:t>"Der dritte Absatz wird gezielt </a:t>
-            </a:r>
-            <a:r>
-              <a:rPr kumimoji="0" lang="de-DE" altLang="de-DE" sz="1200" b="0" i="0" u="none" strike="noStrike" cap="none" normalizeH="0" baseline="0">
-                <a:ln>
-                  <a:noFill/>
-                </a:ln>
+              <a:t>"Der dritte Absatz wird gezielt angesteuert</a:t>
+            </a:r>
+            <a:r>
+              <a:rPr lang="de-DE" altLang="de-DE" sz="1200" dirty="0">
                 <a:solidFill>
                   <a:srgbClr val="6A8759"/>
                 </a:solidFill>
-                <a:effectLst/>
-                <a:latin typeface="Consolas" panose="020B0609020204030204" pitchFamily="49" charset="0"/>
-              </a:rPr>
-              <a:t>angesteuert</a:t>
-            </a:r>
-            <a:r>
-              <a:rPr lang="de-DE" altLang="de-DE" sz="1200">
-                <a:solidFill>
-                  <a:srgbClr val="6A8759"/>
-                </a:solidFill>
                 <a:latin typeface="Consolas" panose="020B0609020204030204" pitchFamily="49" charset="0"/>
               </a:rPr>
               <a:t>.")</a:t>
             </a:r>
             <a:r>
-              <a:rPr kumimoji="0" lang="de-DE" altLang="de-DE" sz="1200" b="0" i="0" u="none" strike="noStrike" cap="none" normalizeH="0" baseline="0">
+              <a:rPr kumimoji="0" lang="de-DE" altLang="de-DE" sz="1200" b="0" i="0" u="none" strike="noStrike" cap="none" normalizeH="0" baseline="0" dirty="0">
                 <a:ln>
                   <a:noFill/>
                 </a:ln>
@@ -13709,7 +13696,7 @@
         <p:spPr>
           <a:xfrm>
             <a:off x="949135" y="1749651"/>
-            <a:ext cx="10293728" cy="286232"/>
+            <a:ext cx="10293728" cy="608372"/>
           </a:xfrm>
         </p:spPr>
         <p:txBody>
@@ -13721,6 +13708,30 @@
               <a:rPr lang="de-AT" dirty="0"/>
               <a:t>Der erste Befehl gilt für alle p-Tags, der zweite hingegen nur für das dritte Element im Dokument</a:t>
             </a:r>
+          </a:p>
+          <a:p>
+            <a:pPr algn="ctr"/>
+            <a:r>
+              <a:rPr lang="de-AT" dirty="0"/>
+              <a:t>https://</a:t>
+            </a:r>
+            <a:r>
+              <a:rPr lang="de-AT" dirty="0" err="1"/>
+              <a:t>api.jquery.com</a:t>
+            </a:r>
+            <a:r>
+              <a:rPr lang="de-AT" dirty="0"/>
+              <a:t>/</a:t>
+            </a:r>
+            <a:r>
+              <a:rPr lang="de-AT" dirty="0" err="1"/>
+              <a:t>eq</a:t>
+            </a:r>
+            <a:r>
+              <a:rPr lang="de-AT"/>
+              <a:t>/</a:t>
+            </a:r>
+            <a:endParaRPr lang="de-AT" dirty="0"/>
           </a:p>
         </p:txBody>
       </p:sp>

</xml_diff>